<commit_message>
update ppt & add function of draw uniform curve
</commit_message>
<xml_diff>
--- a/PPT/关于贝塞尔曲线等速移动问题的说明.pptx
+++ b/PPT/关于贝塞尔曲线等速移动问题的说明.pptx
@@ -6588,35 +6588,21 @@
                 <a:latin typeface="Microsoft YaHei" pitchFamily="34" charset="-122"/>
                 <a:ea typeface="Microsoft YaHei" pitchFamily="34" charset="-122"/>
               </a:rPr>
-              <a:t>时间内所经过</a:t>
+              <a:t>时间内所经过的距离 </a:t>
+            </a:r>
+            <a:r>
+              <a:rPr lang="en-US" altLang="zh-CN" sz="1800" dirty="0" smtClean="0">
+                <a:latin typeface="Microsoft YaHei" pitchFamily="34" charset="-122"/>
+                <a:ea typeface="Microsoft YaHei" pitchFamily="34" charset="-122"/>
+              </a:rPr>
+              <a:t>L </a:t>
             </a:r>
             <a:r>
               <a:rPr lang="zh-CN" altLang="en-US" sz="1800" dirty="0" smtClean="0">
                 <a:latin typeface="Microsoft YaHei" pitchFamily="34" charset="-122"/>
                 <a:ea typeface="Microsoft YaHei" pitchFamily="34" charset="-122"/>
               </a:rPr>
-              <a:t>的距离 </a:t>
-            </a:r>
-            <a:r>
-              <a:rPr lang="en-US" altLang="zh-CN" sz="1800" dirty="0" smtClean="0">
-                <a:latin typeface="Microsoft YaHei" pitchFamily="34" charset="-122"/>
-                <a:ea typeface="Microsoft YaHei" pitchFamily="34" charset="-122"/>
-              </a:rPr>
-              <a:t>L </a:t>
-            </a:r>
-            <a:r>
-              <a:rPr lang="zh-CN" altLang="en-US" sz="1800" dirty="0" smtClean="0">
-                <a:latin typeface="Microsoft YaHei" pitchFamily="34" charset="-122"/>
-                <a:ea typeface="Microsoft YaHei" pitchFamily="34" charset="-122"/>
-              </a:rPr>
-              <a:t>可以近似为</a:t>
-            </a:r>
-            <a:r>
-              <a:rPr lang="zh-CN" altLang="en-US" sz="1800" dirty="0" smtClean="0">
-                <a:latin typeface="Microsoft YaHei" pitchFamily="34" charset="-122"/>
-                <a:ea typeface="Microsoft YaHei" pitchFamily="34" charset="-122"/>
-              </a:rPr>
-              <a:t> </a:t>
+              <a:t>可以近似为 </a:t>
             </a:r>
             <a:r>
               <a:rPr lang="en-US" altLang="zh-CN" sz="1800" dirty="0" smtClean="0">

</xml_diff>